<commit_message>
final version presentation for stph workshop
</commit_message>
<xml_diff>
--- a/r_package/varia/Workshops_and_demos/2025_06_30_Swiss_TPH/images/images_for_presentation.pptx
+++ b/r_package/varia/Workshops_and_demos/2025_06_30_Swiss_TPH/images/images_for_presentation.pptx
@@ -10,8 +10,9 @@
     <p:sldId id="260" r:id="rId4"/>
     <p:sldId id="259" r:id="rId5"/>
     <p:sldId id="262" r:id="rId6"/>
-    <p:sldId id="264" r:id="rId7"/>
-    <p:sldId id="263" r:id="rId8"/>
+    <p:sldId id="265" r:id="rId7"/>
+    <p:sldId id="264" r:id="rId8"/>
+    <p:sldId id="263" r:id="rId9"/>
   </p:sldIdLst>
   <p:sldSz cx="12192000" cy="6858000"/>
   <p:notesSz cx="6858000" cy="9144000"/>
@@ -265,7 +266,7 @@
           <a:p>
             <a:fld id="{2AECC169-8D99-43BA-9020-AC448D8397CC}" type="datetimeFigureOut">
               <a:rPr lang="en-US" smtClean="0"/>
-              <a:t>6/23/2025</a:t>
+              <a:t>6/27/2025</a:t>
             </a:fld>
             <a:endParaRPr lang="en-US"/>
           </a:p>
@@ -463,7 +464,7 @@
           <a:p>
             <a:fld id="{2AECC169-8D99-43BA-9020-AC448D8397CC}" type="datetimeFigureOut">
               <a:rPr lang="en-US" smtClean="0"/>
-              <a:t>6/23/2025</a:t>
+              <a:t>6/27/2025</a:t>
             </a:fld>
             <a:endParaRPr lang="en-US"/>
           </a:p>
@@ -671,7 +672,7 @@
           <a:p>
             <a:fld id="{2AECC169-8D99-43BA-9020-AC448D8397CC}" type="datetimeFigureOut">
               <a:rPr lang="en-US" smtClean="0"/>
-              <a:t>6/23/2025</a:t>
+              <a:t>6/27/2025</a:t>
             </a:fld>
             <a:endParaRPr lang="en-US"/>
           </a:p>
@@ -869,7 +870,7 @@
           <a:p>
             <a:fld id="{2AECC169-8D99-43BA-9020-AC448D8397CC}" type="datetimeFigureOut">
               <a:rPr lang="en-US" smtClean="0"/>
-              <a:t>6/23/2025</a:t>
+              <a:t>6/27/2025</a:t>
             </a:fld>
             <a:endParaRPr lang="en-US"/>
           </a:p>
@@ -1144,7 +1145,7 @@
           <a:p>
             <a:fld id="{2AECC169-8D99-43BA-9020-AC448D8397CC}" type="datetimeFigureOut">
               <a:rPr lang="en-US" smtClean="0"/>
-              <a:t>6/23/2025</a:t>
+              <a:t>6/27/2025</a:t>
             </a:fld>
             <a:endParaRPr lang="en-US"/>
           </a:p>
@@ -1409,7 +1410,7 @@
           <a:p>
             <a:fld id="{2AECC169-8D99-43BA-9020-AC448D8397CC}" type="datetimeFigureOut">
               <a:rPr lang="en-US" smtClean="0"/>
-              <a:t>6/23/2025</a:t>
+              <a:t>6/27/2025</a:t>
             </a:fld>
             <a:endParaRPr lang="en-US"/>
           </a:p>
@@ -1821,7 +1822,7 @@
           <a:p>
             <a:fld id="{2AECC169-8D99-43BA-9020-AC448D8397CC}" type="datetimeFigureOut">
               <a:rPr lang="en-US" smtClean="0"/>
-              <a:t>6/23/2025</a:t>
+              <a:t>6/27/2025</a:t>
             </a:fld>
             <a:endParaRPr lang="en-US"/>
           </a:p>
@@ -1962,7 +1963,7 @@
           <a:p>
             <a:fld id="{2AECC169-8D99-43BA-9020-AC448D8397CC}" type="datetimeFigureOut">
               <a:rPr lang="en-US" smtClean="0"/>
-              <a:t>6/23/2025</a:t>
+              <a:t>6/27/2025</a:t>
             </a:fld>
             <a:endParaRPr lang="en-US"/>
           </a:p>
@@ -2075,7 +2076,7 @@
           <a:p>
             <a:fld id="{2AECC169-8D99-43BA-9020-AC448D8397CC}" type="datetimeFigureOut">
               <a:rPr lang="en-US" smtClean="0"/>
-              <a:t>6/23/2025</a:t>
+              <a:t>6/27/2025</a:t>
             </a:fld>
             <a:endParaRPr lang="en-US"/>
           </a:p>
@@ -2386,7 +2387,7 @@
           <a:p>
             <a:fld id="{2AECC169-8D99-43BA-9020-AC448D8397CC}" type="datetimeFigureOut">
               <a:rPr lang="en-US" smtClean="0"/>
-              <a:t>6/23/2025</a:t>
+              <a:t>6/27/2025</a:t>
             </a:fld>
             <a:endParaRPr lang="en-US"/>
           </a:p>
@@ -2674,7 +2675,7 @@
           <a:p>
             <a:fld id="{2AECC169-8D99-43BA-9020-AC448D8397CC}" type="datetimeFigureOut">
               <a:rPr lang="en-US" smtClean="0"/>
-              <a:t>6/23/2025</a:t>
+              <a:t>6/27/2025</a:t>
             </a:fld>
             <a:endParaRPr lang="en-US"/>
           </a:p>
@@ -2915,7 +2916,7 @@
           <a:p>
             <a:fld id="{2AECC169-8D99-43BA-9020-AC448D8397CC}" type="datetimeFigureOut">
               <a:rPr lang="en-US" smtClean="0"/>
-              <a:t>6/23/2025</a:t>
+              <a:t>6/27/2025</a:t>
             </a:fld>
             <a:endParaRPr lang="en-US"/>
           </a:p>
@@ -4624,6 +4625,48 @@
           </a:p>
         </p:txBody>
       </p:sp>
+      <p:sp>
+        <p:nvSpPr>
+          <p:cNvPr id="5" name="TextBox 4">
+            <a:extLst>
+              <a:ext uri="{FF2B5EF4-FFF2-40B4-BE49-F238E27FC236}">
+                <a16:creationId xmlns:a16="http://schemas.microsoft.com/office/drawing/2014/main" id="{E13A5150-3169-9C73-6D79-12291D79A6EC}"/>
+              </a:ext>
+            </a:extLst>
+          </p:cNvPr>
+          <p:cNvSpPr txBox="1"/>
+          <p:nvPr/>
+        </p:nvSpPr>
+        <p:spPr>
+          <a:xfrm>
+            <a:off x="4244194" y="266330"/>
+            <a:ext cx="2644878" cy="369332"/>
+          </a:xfrm>
+          <a:prstGeom prst="rect">
+            <a:avLst/>
+          </a:prstGeom>
+          <a:noFill/>
+        </p:spPr>
+        <p:txBody>
+          <a:bodyPr wrap="square" rtlCol="0">
+            <a:spAutoFit/>
+          </a:bodyPr>
+          <a:lstStyle/>
+          <a:p>
+            <a:r>
+              <a:rPr lang="en-US" b="0" i="0" dirty="0" err="1">
+                <a:solidFill>
+                  <a:srgbClr val="003B4F"/>
+                </a:solidFill>
+                <a:effectLst/>
+                <a:latin typeface="SFMono-Regular"/>
+              </a:rPr>
+              <a:t>results_pm_copd</a:t>
+            </a:r>
+            <a:endParaRPr lang="en-US" dirty="0"/>
+          </a:p>
+        </p:txBody>
+      </p:sp>
     </p:spTree>
     <p:extLst>
       <p:ext uri="{BB962C8B-B14F-4D97-AF65-F5344CB8AC3E}">
@@ -4638,6 +4681,761 @@
 </file>
 
 <file path=ppt/slides/slide6.xml><?xml version="1.0" encoding="utf-8"?>
+<p:sld xmlns:a="http://schemas.openxmlformats.org/drawingml/2006/main" xmlns:r="http://schemas.openxmlformats.org/officeDocument/2006/relationships" xmlns:p="http://schemas.openxmlformats.org/presentationml/2006/main">
+  <p:cSld>
+    <p:spTree>
+      <p:nvGrpSpPr>
+        <p:cNvPr id="1" name="">
+          <a:extLst>
+            <a:ext uri="{FF2B5EF4-FFF2-40B4-BE49-F238E27FC236}">
+              <a16:creationId xmlns:a16="http://schemas.microsoft.com/office/drawing/2014/main" id="{EF9287EF-6D8D-28C4-1887-30181EA12FB6}"/>
+            </a:ext>
+          </a:extLst>
+        </p:cNvPr>
+        <p:cNvGrpSpPr/>
+        <p:nvPr/>
+      </p:nvGrpSpPr>
+      <p:grpSpPr>
+        <a:xfrm>
+          <a:off x="0" y="0"/>
+          <a:ext cx="0" cy="0"/>
+          <a:chOff x="0" y="0"/>
+          <a:chExt cx="0" cy="0"/>
+        </a:xfrm>
+      </p:grpSpPr>
+      <p:sp>
+        <p:nvSpPr>
+          <p:cNvPr id="11" name="TextBox 10">
+            <a:extLst>
+              <a:ext uri="{FF2B5EF4-FFF2-40B4-BE49-F238E27FC236}">
+                <a16:creationId xmlns:a16="http://schemas.microsoft.com/office/drawing/2014/main" id="{3D1BEF2B-E810-5BF5-EE50-AB8C5B07B038}"/>
+              </a:ext>
+            </a:extLst>
+          </p:cNvPr>
+          <p:cNvSpPr txBox="1"/>
+          <p:nvPr/>
+        </p:nvSpPr>
+        <p:spPr>
+          <a:xfrm>
+            <a:off x="0" y="873760"/>
+            <a:ext cx="2994825" cy="1508105"/>
+          </a:xfrm>
+          <a:prstGeom prst="rect">
+            <a:avLst/>
+          </a:prstGeom>
+          <a:noFill/>
+        </p:spPr>
+        <p:txBody>
+          <a:bodyPr wrap="square" rtlCol="0">
+            <a:spAutoFit/>
+          </a:bodyPr>
+          <a:lstStyle/>
+          <a:p>
+            <a:endParaRPr lang="en-US" sz="3200" dirty="0">
+              <a:solidFill>
+                <a:srgbClr val="535CB0"/>
+              </a:solidFill>
+            </a:endParaRPr>
+          </a:p>
+          <a:p>
+            <a:r>
+              <a:rPr lang="en-US" sz="3200" dirty="0">
+                <a:solidFill>
+                  <a:srgbClr val="535CB0"/>
+                </a:solidFill>
+                <a:latin typeface="SFMono-Regular"/>
+              </a:rPr>
+              <a:t>F</a:t>
+            </a:r>
+            <a:r>
+              <a:rPr lang="en-US" sz="3200" b="0" i="0" dirty="0">
+                <a:solidFill>
+                  <a:srgbClr val="535CB0"/>
+                </a:solidFill>
+                <a:effectLst/>
+                <a:latin typeface="SFMono-Regular"/>
+              </a:rPr>
+              <a:t>unction name</a:t>
+            </a:r>
+            <a:endParaRPr lang="en-US" sz="3200" dirty="0">
+              <a:solidFill>
+                <a:srgbClr val="535CB0"/>
+              </a:solidFill>
+            </a:endParaRPr>
+          </a:p>
+          <a:p>
+            <a:endParaRPr lang="en-US" sz="2800" dirty="0">
+              <a:solidFill>
+                <a:srgbClr val="535CB0"/>
+              </a:solidFill>
+            </a:endParaRPr>
+          </a:p>
+        </p:txBody>
+      </p:sp>
+      <p:sp>
+        <p:nvSpPr>
+          <p:cNvPr id="14" name="Left Brace 13">
+            <a:extLst>
+              <a:ext uri="{FF2B5EF4-FFF2-40B4-BE49-F238E27FC236}">
+                <a16:creationId xmlns:a16="http://schemas.microsoft.com/office/drawing/2014/main" id="{DD4FF847-B922-35FE-CD46-9DC7DAD7E6E6}"/>
+              </a:ext>
+            </a:extLst>
+          </p:cNvPr>
+          <p:cNvSpPr/>
+          <p:nvPr/>
+        </p:nvSpPr>
+        <p:spPr>
+          <a:xfrm rot="16200000">
+            <a:off x="4783028" y="4267097"/>
+            <a:ext cx="540261" cy="2321657"/>
+          </a:xfrm>
+          <a:prstGeom prst="leftBrace">
+            <a:avLst>
+              <a:gd name="adj1" fmla="val 8333"/>
+              <a:gd name="adj2" fmla="val 49591"/>
+            </a:avLst>
+          </a:prstGeom>
+          <a:noFill/>
+          <a:ln>
+            <a:solidFill>
+              <a:srgbClr val="6C7A23"/>
+            </a:solidFill>
+          </a:ln>
+        </p:spPr>
+        <p:style>
+          <a:lnRef idx="2">
+            <a:schemeClr val="accent1"/>
+          </a:lnRef>
+          <a:fillRef idx="0">
+            <a:schemeClr val="accent1"/>
+          </a:fillRef>
+          <a:effectRef idx="1">
+            <a:schemeClr val="accent1"/>
+          </a:effectRef>
+          <a:fontRef idx="minor">
+            <a:schemeClr val="tx1"/>
+          </a:fontRef>
+        </p:style>
+        <p:txBody>
+          <a:bodyPr rtlCol="0" anchor="ctr"/>
+          <a:lstStyle/>
+          <a:p>
+            <a:pPr algn="ctr"/>
+            <a:endParaRPr lang="en-US">
+              <a:ln>
+                <a:solidFill>
+                  <a:srgbClr val="6C7A23"/>
+                </a:solidFill>
+              </a:ln>
+              <a:solidFill>
+                <a:srgbClr val="7B8839"/>
+              </a:solidFill>
+            </a:endParaRPr>
+          </a:p>
+        </p:txBody>
+      </p:sp>
+      <p:sp>
+        <p:nvSpPr>
+          <p:cNvPr id="15" name="TextBox 14">
+            <a:extLst>
+              <a:ext uri="{FF2B5EF4-FFF2-40B4-BE49-F238E27FC236}">
+                <a16:creationId xmlns:a16="http://schemas.microsoft.com/office/drawing/2014/main" id="{985D18CF-9805-FE07-0992-E070463FFB35}"/>
+              </a:ext>
+            </a:extLst>
+          </p:cNvPr>
+          <p:cNvSpPr txBox="1"/>
+          <p:nvPr/>
+        </p:nvSpPr>
+        <p:spPr>
+          <a:xfrm>
+            <a:off x="3263938" y="5737665"/>
+            <a:ext cx="3526358" cy="584775"/>
+          </a:xfrm>
+          <a:prstGeom prst="rect">
+            <a:avLst/>
+          </a:prstGeom>
+          <a:noFill/>
+        </p:spPr>
+        <p:txBody>
+          <a:bodyPr wrap="square" rtlCol="0">
+            <a:spAutoFit/>
+          </a:bodyPr>
+          <a:lstStyle/>
+          <a:p>
+            <a:r>
+              <a:rPr lang="en-US" sz="3200" dirty="0">
+                <a:solidFill>
+                  <a:srgbClr val="6C7A23"/>
+                </a:solidFill>
+                <a:latin typeface="SFMono-Regular"/>
+              </a:rPr>
+              <a:t>F</a:t>
+            </a:r>
+            <a:r>
+              <a:rPr lang="en-US" sz="3200" b="0" i="0" dirty="0">
+                <a:solidFill>
+                  <a:srgbClr val="6C7A23"/>
+                </a:solidFill>
+                <a:effectLst/>
+                <a:latin typeface="SFMono-Regular"/>
+              </a:rPr>
+              <a:t>unction arguments</a:t>
+            </a:r>
+            <a:endParaRPr lang="en-US" sz="3200" dirty="0">
+              <a:solidFill>
+                <a:srgbClr val="6C7A23"/>
+              </a:solidFill>
+            </a:endParaRPr>
+          </a:p>
+        </p:txBody>
+      </p:sp>
+      <p:sp>
+        <p:nvSpPr>
+          <p:cNvPr id="16" name="TextBox 15">
+            <a:extLst>
+              <a:ext uri="{FF2B5EF4-FFF2-40B4-BE49-F238E27FC236}">
+                <a16:creationId xmlns:a16="http://schemas.microsoft.com/office/drawing/2014/main" id="{C2748276-5B26-7C56-C9D1-64BCAD6AD126}"/>
+              </a:ext>
+            </a:extLst>
+          </p:cNvPr>
+          <p:cNvSpPr txBox="1"/>
+          <p:nvPr/>
+        </p:nvSpPr>
+        <p:spPr>
+          <a:xfrm>
+            <a:off x="6885967" y="5737664"/>
+            <a:ext cx="3109290" cy="584775"/>
+          </a:xfrm>
+          <a:prstGeom prst="rect">
+            <a:avLst/>
+          </a:prstGeom>
+          <a:noFill/>
+        </p:spPr>
+        <p:txBody>
+          <a:bodyPr wrap="square" rtlCol="0">
+            <a:spAutoFit/>
+          </a:bodyPr>
+          <a:lstStyle/>
+          <a:p>
+            <a:r>
+              <a:rPr lang="en-US" sz="3200" b="0" i="0" dirty="0">
+                <a:solidFill>
+                  <a:srgbClr val="A10E00"/>
+                </a:solidFill>
+                <a:effectLst/>
+                <a:latin typeface="SFMono-Regular"/>
+              </a:rPr>
+              <a:t>Input values</a:t>
+            </a:r>
+            <a:endParaRPr lang="en-US" sz="3200" dirty="0">
+              <a:solidFill>
+                <a:srgbClr val="A10E00"/>
+              </a:solidFill>
+            </a:endParaRPr>
+          </a:p>
+        </p:txBody>
+      </p:sp>
+      <p:sp>
+        <p:nvSpPr>
+          <p:cNvPr id="2" name="Left Brace 1">
+            <a:extLst>
+              <a:ext uri="{FF2B5EF4-FFF2-40B4-BE49-F238E27FC236}">
+                <a16:creationId xmlns:a16="http://schemas.microsoft.com/office/drawing/2014/main" id="{9E192DAF-2E06-4A8C-EB81-9BCC1A1B82CB}"/>
+              </a:ext>
+            </a:extLst>
+          </p:cNvPr>
+          <p:cNvSpPr/>
+          <p:nvPr/>
+        </p:nvSpPr>
+        <p:spPr>
+          <a:xfrm rot="16200000">
+            <a:off x="7635186" y="4277486"/>
+            <a:ext cx="540261" cy="2321657"/>
+          </a:xfrm>
+          <a:prstGeom prst="leftBrace">
+            <a:avLst>
+              <a:gd name="adj1" fmla="val 8333"/>
+              <a:gd name="adj2" fmla="val 49591"/>
+            </a:avLst>
+          </a:prstGeom>
+          <a:noFill/>
+          <a:ln>
+            <a:solidFill>
+              <a:srgbClr val="AD2C1F"/>
+            </a:solidFill>
+          </a:ln>
+        </p:spPr>
+        <p:style>
+          <a:lnRef idx="2">
+            <a:schemeClr val="accent1"/>
+          </a:lnRef>
+          <a:fillRef idx="0">
+            <a:schemeClr val="accent1"/>
+          </a:fillRef>
+          <a:effectRef idx="1">
+            <a:schemeClr val="accent1"/>
+          </a:effectRef>
+          <a:fontRef idx="minor">
+            <a:schemeClr val="tx1"/>
+          </a:fontRef>
+        </p:style>
+        <p:txBody>
+          <a:bodyPr rtlCol="0" anchor="ctr"/>
+          <a:lstStyle/>
+          <a:p>
+            <a:pPr algn="ctr"/>
+            <a:endParaRPr lang="en-US">
+              <a:ln>
+                <a:solidFill>
+                  <a:srgbClr val="6C7A23"/>
+                </a:solidFill>
+              </a:ln>
+              <a:solidFill>
+                <a:srgbClr val="7B8839"/>
+              </a:solidFill>
+            </a:endParaRPr>
+          </a:p>
+        </p:txBody>
+      </p:sp>
+      <p:sp>
+        <p:nvSpPr>
+          <p:cNvPr id="3" name="Rectangle 2">
+            <a:extLst>
+              <a:ext uri="{FF2B5EF4-FFF2-40B4-BE49-F238E27FC236}">
+                <a16:creationId xmlns:a16="http://schemas.microsoft.com/office/drawing/2014/main" id="{30961AA8-D260-1E58-3001-A9C4C45B883E}"/>
+              </a:ext>
+            </a:extLst>
+          </p:cNvPr>
+          <p:cNvSpPr/>
+          <p:nvPr/>
+        </p:nvSpPr>
+        <p:spPr>
+          <a:xfrm>
+            <a:off x="3373516" y="1187116"/>
+            <a:ext cx="5666959" cy="3820312"/>
+          </a:xfrm>
+          <a:prstGeom prst="rect">
+            <a:avLst/>
+          </a:prstGeom>
+          <a:noFill/>
+          <a:ln w="31750">
+            <a:solidFill>
+              <a:schemeClr val="tx1"/>
+            </a:solidFill>
+          </a:ln>
+        </p:spPr>
+        <p:style>
+          <a:lnRef idx="2">
+            <a:schemeClr val="accent1">
+              <a:shade val="15000"/>
+            </a:schemeClr>
+          </a:lnRef>
+          <a:fillRef idx="1">
+            <a:schemeClr val="accent1"/>
+          </a:fillRef>
+          <a:effectRef idx="0">
+            <a:schemeClr val="accent1"/>
+          </a:effectRef>
+          <a:fontRef idx="minor">
+            <a:schemeClr val="lt1"/>
+          </a:fontRef>
+        </p:style>
+        <p:txBody>
+          <a:bodyPr rtlCol="0" anchor="ctr"/>
+          <a:lstStyle/>
+          <a:p>
+            <a:pPr algn="ctr"/>
+            <a:endParaRPr lang="en-US"/>
+          </a:p>
+        </p:txBody>
+      </p:sp>
+      <p:sp>
+        <p:nvSpPr>
+          <p:cNvPr id="4" name="TextBox 3">
+            <a:extLst>
+              <a:ext uri="{FF2B5EF4-FFF2-40B4-BE49-F238E27FC236}">
+                <a16:creationId xmlns:a16="http://schemas.microsoft.com/office/drawing/2014/main" id="{7495615A-4B56-4186-5431-87A4D2BF13D9}"/>
+              </a:ext>
+            </a:extLst>
+          </p:cNvPr>
+          <p:cNvSpPr txBox="1"/>
+          <p:nvPr/>
+        </p:nvSpPr>
+        <p:spPr>
+          <a:xfrm>
+            <a:off x="6885967" y="689140"/>
+            <a:ext cx="2321656" cy="584775"/>
+          </a:xfrm>
+          <a:prstGeom prst="rect">
+            <a:avLst/>
+          </a:prstGeom>
+          <a:noFill/>
+        </p:spPr>
+        <p:txBody>
+          <a:bodyPr wrap="square" rtlCol="0">
+            <a:spAutoFit/>
+          </a:bodyPr>
+          <a:lstStyle/>
+          <a:p>
+            <a:r>
+              <a:rPr lang="en-US" sz="3200" b="0" i="0" dirty="0">
+                <a:effectLst/>
+                <a:latin typeface="SFMono-Regular"/>
+              </a:rPr>
+              <a:t>Function call</a:t>
+            </a:r>
+            <a:endParaRPr lang="en-US" sz="3200" dirty="0"/>
+          </a:p>
+        </p:txBody>
+      </p:sp>
+      <p:sp>
+        <p:nvSpPr>
+          <p:cNvPr id="5" name="TextBox 4">
+            <a:extLst>
+              <a:ext uri="{FF2B5EF4-FFF2-40B4-BE49-F238E27FC236}">
+                <a16:creationId xmlns:a16="http://schemas.microsoft.com/office/drawing/2014/main" id="{837AB7E6-3247-9A31-6B77-625BE4C73073}"/>
+              </a:ext>
+            </a:extLst>
+          </p:cNvPr>
+          <p:cNvSpPr txBox="1"/>
+          <p:nvPr/>
+        </p:nvSpPr>
+        <p:spPr>
+          <a:xfrm>
+            <a:off x="10841259" y="827593"/>
+            <a:ext cx="4180715" cy="3108543"/>
+          </a:xfrm>
+          <a:prstGeom prst="rect">
+            <a:avLst/>
+          </a:prstGeom>
+          <a:noFill/>
+        </p:spPr>
+        <p:txBody>
+          <a:bodyPr wrap="square" rtlCol="0">
+            <a:spAutoFit/>
+          </a:bodyPr>
+          <a:lstStyle/>
+          <a:p>
+            <a:r>
+              <a:rPr lang="en-US" sz="2800" b="0" i="0" dirty="0">
+                <a:solidFill>
+                  <a:srgbClr val="003B4F"/>
+                </a:solidFill>
+                <a:effectLst/>
+                <a:latin typeface="SFMono-Regular"/>
+              </a:rPr>
+              <a:t>attribute_health(</a:t>
+            </a:r>
+          </a:p>
+          <a:p>
+            <a:r>
+              <a:rPr lang="en-US" sz="2800" dirty="0">
+                <a:solidFill>
+                  <a:srgbClr val="003B4F"/>
+                </a:solidFill>
+                <a:latin typeface="SFMono-Regular"/>
+              </a:rPr>
+              <a:t>  </a:t>
+            </a:r>
+            <a:r>
+              <a:rPr lang="en-US" sz="2800" b="0" i="0" dirty="0" err="1">
+                <a:solidFill>
+                  <a:srgbClr val="003B4F"/>
+                </a:solidFill>
+                <a:effectLst/>
+                <a:latin typeface="SFMono-Regular"/>
+              </a:rPr>
+              <a:t>erf_shape</a:t>
+            </a:r>
+            <a:r>
+              <a:rPr lang="en-US" sz="2800" b="0" i="0" dirty="0">
+                <a:solidFill>
+                  <a:srgbClr val="003B4F"/>
+                </a:solidFill>
+                <a:effectLst/>
+                <a:latin typeface="SFMono-Regular"/>
+              </a:rPr>
+              <a:t> = "</a:t>
+            </a:r>
+            <a:r>
+              <a:rPr lang="en-US" sz="2800" b="0" i="0" dirty="0" err="1">
+                <a:solidFill>
+                  <a:srgbClr val="003B4F"/>
+                </a:solidFill>
+                <a:effectLst/>
+                <a:latin typeface="SFMono-Regular"/>
+              </a:rPr>
+              <a:t>log_linear</a:t>
+            </a:r>
+            <a:r>
+              <a:rPr lang="en-US" sz="2800" b="0" i="0" dirty="0">
+                <a:solidFill>
+                  <a:srgbClr val="003B4F"/>
+                </a:solidFill>
+                <a:effectLst/>
+                <a:latin typeface="SFMono-Regular"/>
+              </a:rPr>
+              <a:t>",</a:t>
+            </a:r>
+          </a:p>
+          <a:p>
+            <a:r>
+              <a:rPr lang="en-US" sz="2800" b="0" i="0" dirty="0">
+                <a:solidFill>
+                  <a:srgbClr val="003B4F"/>
+                </a:solidFill>
+                <a:effectLst/>
+                <a:latin typeface="SFMono-Regular"/>
+              </a:rPr>
+              <a:t>  </a:t>
+            </a:r>
+            <a:r>
+              <a:rPr lang="en-US" sz="2800" b="0" i="0" dirty="0" err="1">
+                <a:solidFill>
+                  <a:srgbClr val="003B4F"/>
+                </a:solidFill>
+                <a:effectLst/>
+                <a:latin typeface="SFMono-Regular"/>
+              </a:rPr>
+              <a:t>rr_central</a:t>
+            </a:r>
+            <a:r>
+              <a:rPr lang="en-US" sz="2800" b="0" i="0" dirty="0">
+                <a:solidFill>
+                  <a:srgbClr val="003B4F"/>
+                </a:solidFill>
+                <a:effectLst/>
+                <a:latin typeface="SFMono-Regular"/>
+              </a:rPr>
+              <a:t> = 1.369,</a:t>
+            </a:r>
+          </a:p>
+          <a:p>
+            <a:r>
+              <a:rPr lang="en-US" sz="2800" b="0" i="0" dirty="0">
+                <a:solidFill>
+                  <a:srgbClr val="003B4F"/>
+                </a:solidFill>
+                <a:effectLst/>
+                <a:latin typeface="SFMono-Regular"/>
+              </a:rPr>
+              <a:t>  </a:t>
+            </a:r>
+            <a:r>
+              <a:rPr lang="en-US" sz="2800" b="0" i="0" dirty="0" err="1">
+                <a:solidFill>
+                  <a:srgbClr val="003B4F"/>
+                </a:solidFill>
+                <a:effectLst/>
+                <a:latin typeface="SFMono-Regular"/>
+              </a:rPr>
+              <a:t>rr_increment</a:t>
+            </a:r>
+            <a:r>
+              <a:rPr lang="en-US" sz="2800" b="0" i="0" dirty="0">
+                <a:solidFill>
+                  <a:srgbClr val="003B4F"/>
+                </a:solidFill>
+                <a:effectLst/>
+                <a:latin typeface="SFMono-Regular"/>
+              </a:rPr>
+              <a:t> = 10,</a:t>
+            </a:r>
+          </a:p>
+          <a:p>
+            <a:r>
+              <a:rPr lang="en-US" sz="2800" b="0" i="0" dirty="0">
+                <a:solidFill>
+                  <a:srgbClr val="003B4F"/>
+                </a:solidFill>
+                <a:effectLst/>
+                <a:latin typeface="SFMono-Regular"/>
+              </a:rPr>
+              <a:t>  </a:t>
+            </a:r>
+            <a:r>
+              <a:rPr lang="en-US" sz="2800" b="0" i="0" dirty="0" err="1">
+                <a:solidFill>
+                  <a:srgbClr val="003B4F"/>
+                </a:solidFill>
+                <a:effectLst/>
+                <a:latin typeface="SFMono-Regular"/>
+              </a:rPr>
+              <a:t>exp_central</a:t>
+            </a:r>
+            <a:r>
+              <a:rPr lang="en-US" sz="2800" b="0" i="0" dirty="0">
+                <a:solidFill>
+                  <a:srgbClr val="003B4F"/>
+                </a:solidFill>
+                <a:effectLst/>
+                <a:latin typeface="SFMono-Regular"/>
+              </a:rPr>
+              <a:t> = 8.85, </a:t>
+            </a:r>
+          </a:p>
+          <a:p>
+            <a:r>
+              <a:rPr lang="en-US" sz="2800" dirty="0">
+                <a:solidFill>
+                  <a:srgbClr val="003B4F"/>
+                </a:solidFill>
+                <a:latin typeface="SFMono-Regular"/>
+              </a:rPr>
+              <a:t> </a:t>
+            </a:r>
+            <a:r>
+              <a:rPr lang="en-US" sz="2800" b="0" i="0" dirty="0">
+                <a:solidFill>
+                  <a:srgbClr val="003B4F"/>
+                </a:solidFill>
+                <a:effectLst/>
+                <a:latin typeface="SFMono-Regular"/>
+              </a:rPr>
+              <a:t> </a:t>
+            </a:r>
+            <a:r>
+              <a:rPr lang="en-US" sz="2800" b="0" i="0" dirty="0" err="1">
+                <a:solidFill>
+                  <a:srgbClr val="003B4F"/>
+                </a:solidFill>
+                <a:effectLst/>
+                <a:latin typeface="SFMono-Regular"/>
+              </a:rPr>
+              <a:t>bhd_central</a:t>
+            </a:r>
+            <a:r>
+              <a:rPr lang="en-US" sz="2800" b="0" i="0" dirty="0">
+                <a:solidFill>
+                  <a:srgbClr val="003B4F"/>
+                </a:solidFill>
+                <a:effectLst/>
+                <a:latin typeface="SFMono-Regular"/>
+              </a:rPr>
+              <a:t> = 30747</a:t>
+            </a:r>
+          </a:p>
+          <a:p>
+            <a:r>
+              <a:rPr lang="en-US" sz="2800" b="0" i="0" dirty="0">
+                <a:solidFill>
+                  <a:srgbClr val="003B4F"/>
+                </a:solidFill>
+                <a:effectLst/>
+                <a:latin typeface="SFMono-Regular"/>
+              </a:rPr>
+              <a:t>)</a:t>
+            </a:r>
+            <a:endParaRPr lang="en-US" sz="2800" dirty="0"/>
+          </a:p>
+        </p:txBody>
+      </p:sp>
+      <p:pic>
+        <p:nvPicPr>
+          <p:cNvPr id="7" name="Picture 6">
+            <a:extLst>
+              <a:ext uri="{FF2B5EF4-FFF2-40B4-BE49-F238E27FC236}">
+                <a16:creationId xmlns:a16="http://schemas.microsoft.com/office/drawing/2014/main" id="{B9084BEA-A797-EB40-E309-118FE5A246E2}"/>
+              </a:ext>
+            </a:extLst>
+          </p:cNvPr>
+          <p:cNvPicPr>
+            <a:picLocks noChangeAspect="1"/>
+          </p:cNvPicPr>
+          <p:nvPr/>
+        </p:nvPicPr>
+        <p:blipFill>
+          <a:blip r:embed="rId2"/>
+          <a:stretch>
+            <a:fillRect/>
+          </a:stretch>
+        </p:blipFill>
+        <p:spPr>
+          <a:xfrm>
+            <a:off x="3458610" y="1505522"/>
+            <a:ext cx="5510754" cy="3270299"/>
+          </a:xfrm>
+          <a:prstGeom prst="rect">
+            <a:avLst/>
+          </a:prstGeom>
+        </p:spPr>
+      </p:pic>
+      <p:sp>
+        <p:nvSpPr>
+          <p:cNvPr id="8" name="Left Brace 7">
+            <a:extLst>
+              <a:ext uri="{FF2B5EF4-FFF2-40B4-BE49-F238E27FC236}">
+                <a16:creationId xmlns:a16="http://schemas.microsoft.com/office/drawing/2014/main" id="{A4FEAD92-7ABB-DFBE-10AA-BECBFB90C19D}"/>
+              </a:ext>
+            </a:extLst>
+          </p:cNvPr>
+          <p:cNvSpPr/>
+          <p:nvPr/>
+        </p:nvSpPr>
+        <p:spPr>
+          <a:xfrm>
+            <a:off x="2723677" y="1505522"/>
+            <a:ext cx="540261" cy="432111"/>
+          </a:xfrm>
+          <a:prstGeom prst="leftBrace">
+            <a:avLst>
+              <a:gd name="adj1" fmla="val 8333"/>
+              <a:gd name="adj2" fmla="val 49591"/>
+            </a:avLst>
+          </a:prstGeom>
+          <a:noFill/>
+          <a:ln>
+            <a:solidFill>
+              <a:srgbClr val="535CB0"/>
+            </a:solidFill>
+          </a:ln>
+        </p:spPr>
+        <p:style>
+          <a:lnRef idx="2">
+            <a:schemeClr val="accent1"/>
+          </a:lnRef>
+          <a:fillRef idx="0">
+            <a:schemeClr val="accent1"/>
+          </a:fillRef>
+          <a:effectRef idx="1">
+            <a:schemeClr val="accent1"/>
+          </a:effectRef>
+          <a:fontRef idx="minor">
+            <a:schemeClr val="tx1"/>
+          </a:fontRef>
+        </p:style>
+        <p:txBody>
+          <a:bodyPr rtlCol="0" anchor="ctr"/>
+          <a:lstStyle/>
+          <a:p>
+            <a:pPr algn="ctr"/>
+            <a:endParaRPr lang="en-US">
+              <a:ln>
+                <a:solidFill>
+                  <a:srgbClr val="6C7A23"/>
+                </a:solidFill>
+              </a:ln>
+              <a:solidFill>
+                <a:srgbClr val="7B8839"/>
+              </a:solidFill>
+            </a:endParaRPr>
+          </a:p>
+        </p:txBody>
+      </p:sp>
+    </p:spTree>
+    <p:extLst>
+      <p:ext uri="{BB962C8B-B14F-4D97-AF65-F5344CB8AC3E}">
+        <p14:creationId xmlns:p14="http://schemas.microsoft.com/office/powerpoint/2010/main" val="3137729436"/>
+      </p:ext>
+    </p:extLst>
+  </p:cSld>
+  <p:clrMapOvr>
+    <a:masterClrMapping/>
+  </p:clrMapOvr>
+</p:sld>
+</file>
+
+<file path=ppt/slides/slide7.xml><?xml version="1.0" encoding="utf-8"?>
 <p:sld xmlns:a="http://schemas.openxmlformats.org/drawingml/2006/main" xmlns:r="http://schemas.openxmlformats.org/officeDocument/2006/relationships" xmlns:p="http://schemas.openxmlformats.org/presentationml/2006/main">
   <p:cSld>
     <p:spTree>
@@ -10936,7 +11734,7 @@
 </p:sld>
 </file>
 
-<file path=ppt/slides/slide7.xml><?xml version="1.0" encoding="utf-8"?>
+<file path=ppt/slides/slide8.xml><?xml version="1.0" encoding="utf-8"?>
 <p:sld xmlns:a="http://schemas.openxmlformats.org/drawingml/2006/main" xmlns:r="http://schemas.openxmlformats.org/officeDocument/2006/relationships" xmlns:p="http://schemas.openxmlformats.org/presentationml/2006/main">
   <p:cSld>
     <p:spTree>

</xml_diff>